<commit_message>
Fix NAs, update text
</commit_message>
<xml_diff>
--- a/DGFS PhD forum welcome.pptx
+++ b/DGFS PhD forum welcome.pptx
@@ -364,7 +364,7 @@
             <a:fld id="{B61BEF0D-F0BB-DE4B-95CE-6DB70DBA9567}" type="datetimeFigureOut">
               <a:rPr lang="en-US" dirty="0"/>
               <a:pPr/>
-              <a:t>2/22/2021</a:t>
+              <a:t>2/22/21</a:t>
             </a:fld>
             <a:endParaRPr lang="en-US" dirty="0"/>
           </a:p>
@@ -439,7 +439,7 @@
             <a:fld id="{D57F1E4F-1CFF-5643-939E-217C01CDF565}" type="slidenum">
               <a:rPr lang="en-US" dirty="0"/>
               <a:pPr/>
-              <a:t>‹Nr.›</a:t>
+              <a:t>‹#›</a:t>
             </a:fld>
             <a:endParaRPr lang="en-US" dirty="0"/>
           </a:p>
@@ -623,7 +623,7 @@
             <a:fld id="{B61BEF0D-F0BB-DE4B-95CE-6DB70DBA9567}" type="datetimeFigureOut">
               <a:rPr lang="en-US" dirty="0"/>
               <a:pPr/>
-              <a:t>2/22/2021</a:t>
+              <a:t>2/22/21</a:t>
             </a:fld>
             <a:endParaRPr lang="en-US" dirty="0"/>
           </a:p>
@@ -666,7 +666,7 @@
             <a:fld id="{D57F1E4F-1CFF-5643-939E-217C01CDF565}" type="slidenum">
               <a:rPr lang="en-US" dirty="0"/>
               <a:pPr/>
-              <a:t>‹Nr.›</a:t>
+              <a:t>‹#›</a:t>
             </a:fld>
             <a:endParaRPr lang="en-US" dirty="0"/>
           </a:p>
@@ -855,7 +855,7 @@
             <a:fld id="{B61BEF0D-F0BB-DE4B-95CE-6DB70DBA9567}" type="datetimeFigureOut">
               <a:rPr lang="en-US" dirty="0"/>
               <a:pPr/>
-              <a:t>2/22/2021</a:t>
+              <a:t>2/22/21</a:t>
             </a:fld>
             <a:endParaRPr lang="en-US" dirty="0"/>
           </a:p>
@@ -919,7 +919,7 @@
             <a:fld id="{D57F1E4F-1CFF-5643-939E-217C01CDF565}" type="slidenum">
               <a:rPr lang="en-US" dirty="0"/>
               <a:pPr/>
-              <a:t>‹Nr.›</a:t>
+              <a:t>‹#›</a:t>
             </a:fld>
             <a:endParaRPr lang="en-US" dirty="0"/>
           </a:p>
@@ -1092,7 +1092,7 @@
             <a:fld id="{B61BEF0D-F0BB-DE4B-95CE-6DB70DBA9567}" type="datetimeFigureOut">
               <a:rPr lang="en-US" dirty="0"/>
               <a:pPr/>
-              <a:t>2/22/2021</a:t>
+              <a:t>2/22/21</a:t>
             </a:fld>
             <a:endParaRPr lang="en-US" dirty="0"/>
           </a:p>
@@ -1140,7 +1140,7 @@
             <a:fld id="{D57F1E4F-1CFF-5643-939E-217C01CDF565}" type="slidenum">
               <a:rPr lang="en-US" dirty="0"/>
               <a:pPr/>
-              <a:t>‹Nr.›</a:t>
+              <a:t>‹#›</a:t>
             </a:fld>
             <a:endParaRPr lang="en-US" dirty="0"/>
           </a:p>
@@ -1396,7 +1396,7 @@
             <a:fld id="{B61BEF0D-F0BB-DE4B-95CE-6DB70DBA9567}" type="datetimeFigureOut">
               <a:rPr lang="en-US" dirty="0"/>
               <a:pPr/>
-              <a:t>2/22/2021</a:t>
+              <a:t>2/22/21</a:t>
             </a:fld>
             <a:endParaRPr lang="en-US" dirty="0"/>
           </a:p>
@@ -1461,7 +1461,7 @@
             <a:fld id="{D57F1E4F-1CFF-5643-939E-217C01CDF565}" type="slidenum">
               <a:rPr lang="en-US" dirty="0"/>
               <a:pPr/>
-              <a:t>‹Nr.›</a:t>
+              <a:t>‹#›</a:t>
             </a:fld>
             <a:endParaRPr lang="en-US" dirty="0"/>
           </a:p>
@@ -1695,7 +1695,7 @@
             <a:fld id="{B61BEF0D-F0BB-DE4B-95CE-6DB70DBA9567}" type="datetimeFigureOut">
               <a:rPr lang="en-US" dirty="0"/>
               <a:pPr/>
-              <a:t>2/22/2021</a:t>
+              <a:t>2/22/21</a:t>
             </a:fld>
             <a:endParaRPr lang="en-US" dirty="0"/>
           </a:p>
@@ -1738,7 +1738,7 @@
             <a:fld id="{D57F1E4F-1CFF-5643-939E-217C01CDF565}" type="slidenum">
               <a:rPr lang="en-US" dirty="0"/>
               <a:pPr/>
-              <a:t>‹Nr.›</a:t>
+              <a:t>‹#›</a:t>
             </a:fld>
             <a:endParaRPr lang="en-US" dirty="0"/>
           </a:p>
@@ -2114,7 +2114,7 @@
             <a:fld id="{B61BEF0D-F0BB-DE4B-95CE-6DB70DBA9567}" type="datetimeFigureOut">
               <a:rPr lang="en-US" dirty="0"/>
               <a:pPr/>
-              <a:t>2/22/2021</a:t>
+              <a:t>2/22/21</a:t>
             </a:fld>
             <a:endParaRPr lang="en-US" dirty="0"/>
           </a:p>
@@ -2157,7 +2157,7 @@
             <a:fld id="{D57F1E4F-1CFF-5643-939E-217C01CDF565}" type="slidenum">
               <a:rPr lang="en-US" dirty="0"/>
               <a:pPr/>
-              <a:t>‹Nr.›</a:t>
+              <a:t>‹#›</a:t>
             </a:fld>
             <a:endParaRPr lang="en-US" dirty="0"/>
           </a:p>
@@ -2206,7 +2206,7 @@
             <a:fld id="{B61BEF0D-F0BB-DE4B-95CE-6DB70DBA9567}" type="datetimeFigureOut">
               <a:rPr lang="en-US" dirty="0"/>
               <a:pPr/>
-              <a:t>2/22/2021</a:t>
+              <a:t>2/22/21</a:t>
             </a:fld>
             <a:endParaRPr lang="en-US" dirty="0"/>
           </a:p>
@@ -2249,7 +2249,7 @@
             <a:fld id="{D57F1E4F-1CFF-5643-939E-217C01CDF565}" type="slidenum">
               <a:rPr lang="en-US" dirty="0"/>
               <a:pPr/>
-              <a:t>‹Nr.›</a:t>
+              <a:t>‹#›</a:t>
             </a:fld>
             <a:endParaRPr lang="en-US" dirty="0"/>
           </a:p>
@@ -2365,7 +2365,7 @@
             <a:fld id="{B61BEF0D-F0BB-DE4B-95CE-6DB70DBA9567}" type="datetimeFigureOut">
               <a:rPr lang="en-US" dirty="0"/>
               <a:pPr/>
-              <a:t>2/22/2021</a:t>
+              <a:t>2/22/21</a:t>
             </a:fld>
             <a:endParaRPr lang="en-US" dirty="0"/>
           </a:p>
@@ -2408,7 +2408,7 @@
             <a:fld id="{D57F1E4F-1CFF-5643-939E-217C01CDF565}" type="slidenum">
               <a:rPr lang="en-US" dirty="0"/>
               <a:pPr/>
-              <a:t>‹Nr.›</a:t>
+              <a:t>‹#›</a:t>
             </a:fld>
             <a:endParaRPr lang="en-US" dirty="0"/>
           </a:p>
@@ -2740,7 +2740,7 @@
             <a:fld id="{B61BEF0D-F0BB-DE4B-95CE-6DB70DBA9567}" type="datetimeFigureOut">
               <a:rPr lang="en-US" dirty="0"/>
               <a:pPr/>
-              <a:t>2/22/2021</a:t>
+              <a:t>2/22/21</a:t>
             </a:fld>
             <a:endParaRPr lang="en-US" dirty="0"/>
           </a:p>
@@ -2805,7 +2805,7 @@
             <a:fld id="{D57F1E4F-1CFF-5643-939E-217C01CDF565}" type="slidenum">
               <a:rPr lang="en-US" dirty="0"/>
               <a:pPr/>
-              <a:t>‹Nr.›</a:t>
+              <a:t>‹#›</a:t>
             </a:fld>
             <a:endParaRPr lang="en-US" dirty="0"/>
           </a:p>
@@ -3026,7 +3026,7 @@
             <a:fld id="{B61BEF0D-F0BB-DE4B-95CE-6DB70DBA9567}" type="datetimeFigureOut">
               <a:rPr lang="en-US" dirty="0"/>
               <a:pPr/>
-              <a:t>2/22/2021</a:t>
+              <a:t>2/22/21</a:t>
             </a:fld>
             <a:endParaRPr lang="en-US" dirty="0"/>
           </a:p>
@@ -3069,7 +3069,7 @@
             <a:fld id="{D57F1E4F-1CFF-5643-939E-217C01CDF565}" type="slidenum">
               <a:rPr lang="en-US" dirty="0"/>
               <a:pPr/>
-              <a:t>‹Nr.›</a:t>
+              <a:t>‹#›</a:t>
             </a:fld>
             <a:endParaRPr lang="en-US" dirty="0"/>
           </a:p>
@@ -3234,7 +3234,7 @@
             <a:fld id="{B61BEF0D-F0BB-DE4B-95CE-6DB70DBA9567}" type="datetimeFigureOut">
               <a:rPr lang="en-US" dirty="0"/>
               <a:pPr/>
-              <a:t>2/22/2021</a:t>
+              <a:t>2/22/21</a:t>
             </a:fld>
             <a:endParaRPr lang="en-US" dirty="0"/>
           </a:p>
@@ -3309,7 +3309,7 @@
             <a:fld id="{D57F1E4F-1CFF-5643-939E-217C01CDF565}" type="slidenum">
               <a:rPr lang="en-US" dirty="0"/>
               <a:pPr/>
-              <a:t>‹Nr.›</a:t>
+              <a:t>‹#›</a:t>
             </a:fld>
             <a:endParaRPr lang="en-US" dirty="0"/>
           </a:p>
@@ -4682,22 +4682,14 @@
             <a:pPr lvl="1"/>
             <a:r>
               <a:rPr lang="en-GB" sz="1800" dirty="0"/>
-              <a:t>It’ll be clearly indicated when a recording starts and ends</a:t>
+              <a:t>Only the teaching portions will be recorded (so feel free to ask questions in the question/exercise blocks!)</a:t>
             </a:r>
           </a:p>
           <a:p>
             <a:pPr lvl="1"/>
             <a:r>
               <a:rPr lang="en-GB" sz="1800" dirty="0"/>
-              <a:t>Questions and exercises will </a:t>
-            </a:r>
-            <a:r>
-              <a:rPr lang="en-GB" sz="1800" b="1" dirty="0"/>
-              <a:t>not</a:t>
-            </a:r>
-            <a:r>
-              <a:rPr lang="en-GB" sz="1800" dirty="0"/>
-              <a:t> be recorded/cut out of the recording later</a:t>
+              <a:t>Please leave your video off in the teaching portions if you want to be 100% sure (but we would be happy to see you in between and only intend to include video of the speaker in final cuts)</a:t>
             </a:r>
           </a:p>
           <a:p>

</xml_diff>

<commit_message>
final changes slides & export to pdf
</commit_message>
<xml_diff>
--- a/DGFS PhD forum welcome.pptx
+++ b/DGFS PhD forum welcome.pptx
@@ -364,7 +364,7 @@
             <a:fld id="{B61BEF0D-F0BB-DE4B-95CE-6DB70DBA9567}" type="datetimeFigureOut">
               <a:rPr lang="en-US" dirty="0"/>
               <a:pPr/>
-              <a:t>2/22/21</a:t>
+              <a:t>2/23/2021</a:t>
             </a:fld>
             <a:endParaRPr lang="en-US" dirty="0"/>
           </a:p>
@@ -439,7 +439,7 @@
             <a:fld id="{D57F1E4F-1CFF-5643-939E-217C01CDF565}" type="slidenum">
               <a:rPr lang="en-US" dirty="0"/>
               <a:pPr/>
-              <a:t>‹#›</a:t>
+              <a:t>‹Nr.›</a:t>
             </a:fld>
             <a:endParaRPr lang="en-US" dirty="0"/>
           </a:p>
@@ -623,7 +623,7 @@
             <a:fld id="{B61BEF0D-F0BB-DE4B-95CE-6DB70DBA9567}" type="datetimeFigureOut">
               <a:rPr lang="en-US" dirty="0"/>
               <a:pPr/>
-              <a:t>2/22/21</a:t>
+              <a:t>2/23/2021</a:t>
             </a:fld>
             <a:endParaRPr lang="en-US" dirty="0"/>
           </a:p>
@@ -666,7 +666,7 @@
             <a:fld id="{D57F1E4F-1CFF-5643-939E-217C01CDF565}" type="slidenum">
               <a:rPr lang="en-US" dirty="0"/>
               <a:pPr/>
-              <a:t>‹#›</a:t>
+              <a:t>‹Nr.›</a:t>
             </a:fld>
             <a:endParaRPr lang="en-US" dirty="0"/>
           </a:p>
@@ -855,7 +855,7 @@
             <a:fld id="{B61BEF0D-F0BB-DE4B-95CE-6DB70DBA9567}" type="datetimeFigureOut">
               <a:rPr lang="en-US" dirty="0"/>
               <a:pPr/>
-              <a:t>2/22/21</a:t>
+              <a:t>2/23/2021</a:t>
             </a:fld>
             <a:endParaRPr lang="en-US" dirty="0"/>
           </a:p>
@@ -919,7 +919,7 @@
             <a:fld id="{D57F1E4F-1CFF-5643-939E-217C01CDF565}" type="slidenum">
               <a:rPr lang="en-US" dirty="0"/>
               <a:pPr/>
-              <a:t>‹#›</a:t>
+              <a:t>‹Nr.›</a:t>
             </a:fld>
             <a:endParaRPr lang="en-US" dirty="0"/>
           </a:p>
@@ -1092,7 +1092,7 @@
             <a:fld id="{B61BEF0D-F0BB-DE4B-95CE-6DB70DBA9567}" type="datetimeFigureOut">
               <a:rPr lang="en-US" dirty="0"/>
               <a:pPr/>
-              <a:t>2/22/21</a:t>
+              <a:t>2/23/2021</a:t>
             </a:fld>
             <a:endParaRPr lang="en-US" dirty="0"/>
           </a:p>
@@ -1140,7 +1140,7 @@
             <a:fld id="{D57F1E4F-1CFF-5643-939E-217C01CDF565}" type="slidenum">
               <a:rPr lang="en-US" dirty="0"/>
               <a:pPr/>
-              <a:t>‹#›</a:t>
+              <a:t>‹Nr.›</a:t>
             </a:fld>
             <a:endParaRPr lang="en-US" dirty="0"/>
           </a:p>
@@ -1396,7 +1396,7 @@
             <a:fld id="{B61BEF0D-F0BB-DE4B-95CE-6DB70DBA9567}" type="datetimeFigureOut">
               <a:rPr lang="en-US" dirty="0"/>
               <a:pPr/>
-              <a:t>2/22/21</a:t>
+              <a:t>2/23/2021</a:t>
             </a:fld>
             <a:endParaRPr lang="en-US" dirty="0"/>
           </a:p>
@@ -1461,7 +1461,7 @@
             <a:fld id="{D57F1E4F-1CFF-5643-939E-217C01CDF565}" type="slidenum">
               <a:rPr lang="en-US" dirty="0"/>
               <a:pPr/>
-              <a:t>‹#›</a:t>
+              <a:t>‹Nr.›</a:t>
             </a:fld>
             <a:endParaRPr lang="en-US" dirty="0"/>
           </a:p>
@@ -1695,7 +1695,7 @@
             <a:fld id="{B61BEF0D-F0BB-DE4B-95CE-6DB70DBA9567}" type="datetimeFigureOut">
               <a:rPr lang="en-US" dirty="0"/>
               <a:pPr/>
-              <a:t>2/22/21</a:t>
+              <a:t>2/23/2021</a:t>
             </a:fld>
             <a:endParaRPr lang="en-US" dirty="0"/>
           </a:p>
@@ -1738,7 +1738,7 @@
             <a:fld id="{D57F1E4F-1CFF-5643-939E-217C01CDF565}" type="slidenum">
               <a:rPr lang="en-US" dirty="0"/>
               <a:pPr/>
-              <a:t>‹#›</a:t>
+              <a:t>‹Nr.›</a:t>
             </a:fld>
             <a:endParaRPr lang="en-US" dirty="0"/>
           </a:p>
@@ -2114,7 +2114,7 @@
             <a:fld id="{B61BEF0D-F0BB-DE4B-95CE-6DB70DBA9567}" type="datetimeFigureOut">
               <a:rPr lang="en-US" dirty="0"/>
               <a:pPr/>
-              <a:t>2/22/21</a:t>
+              <a:t>2/23/2021</a:t>
             </a:fld>
             <a:endParaRPr lang="en-US" dirty="0"/>
           </a:p>
@@ -2157,7 +2157,7 @@
             <a:fld id="{D57F1E4F-1CFF-5643-939E-217C01CDF565}" type="slidenum">
               <a:rPr lang="en-US" dirty="0"/>
               <a:pPr/>
-              <a:t>‹#›</a:t>
+              <a:t>‹Nr.›</a:t>
             </a:fld>
             <a:endParaRPr lang="en-US" dirty="0"/>
           </a:p>
@@ -2206,7 +2206,7 @@
             <a:fld id="{B61BEF0D-F0BB-DE4B-95CE-6DB70DBA9567}" type="datetimeFigureOut">
               <a:rPr lang="en-US" dirty="0"/>
               <a:pPr/>
-              <a:t>2/22/21</a:t>
+              <a:t>2/23/2021</a:t>
             </a:fld>
             <a:endParaRPr lang="en-US" dirty="0"/>
           </a:p>
@@ -2249,7 +2249,7 @@
             <a:fld id="{D57F1E4F-1CFF-5643-939E-217C01CDF565}" type="slidenum">
               <a:rPr lang="en-US" dirty="0"/>
               <a:pPr/>
-              <a:t>‹#›</a:t>
+              <a:t>‹Nr.›</a:t>
             </a:fld>
             <a:endParaRPr lang="en-US" dirty="0"/>
           </a:p>
@@ -2365,7 +2365,7 @@
             <a:fld id="{B61BEF0D-F0BB-DE4B-95CE-6DB70DBA9567}" type="datetimeFigureOut">
               <a:rPr lang="en-US" dirty="0"/>
               <a:pPr/>
-              <a:t>2/22/21</a:t>
+              <a:t>2/23/2021</a:t>
             </a:fld>
             <a:endParaRPr lang="en-US" dirty="0"/>
           </a:p>
@@ -2408,7 +2408,7 @@
             <a:fld id="{D57F1E4F-1CFF-5643-939E-217C01CDF565}" type="slidenum">
               <a:rPr lang="en-US" dirty="0"/>
               <a:pPr/>
-              <a:t>‹#›</a:t>
+              <a:t>‹Nr.›</a:t>
             </a:fld>
             <a:endParaRPr lang="en-US" dirty="0"/>
           </a:p>
@@ -2740,7 +2740,7 @@
             <a:fld id="{B61BEF0D-F0BB-DE4B-95CE-6DB70DBA9567}" type="datetimeFigureOut">
               <a:rPr lang="en-US" dirty="0"/>
               <a:pPr/>
-              <a:t>2/22/21</a:t>
+              <a:t>2/23/2021</a:t>
             </a:fld>
             <a:endParaRPr lang="en-US" dirty="0"/>
           </a:p>
@@ -2805,7 +2805,7 @@
             <a:fld id="{D57F1E4F-1CFF-5643-939E-217C01CDF565}" type="slidenum">
               <a:rPr lang="en-US" dirty="0"/>
               <a:pPr/>
-              <a:t>‹#›</a:t>
+              <a:t>‹Nr.›</a:t>
             </a:fld>
             <a:endParaRPr lang="en-US" dirty="0"/>
           </a:p>
@@ -3026,7 +3026,7 @@
             <a:fld id="{B61BEF0D-F0BB-DE4B-95CE-6DB70DBA9567}" type="datetimeFigureOut">
               <a:rPr lang="en-US" dirty="0"/>
               <a:pPr/>
-              <a:t>2/22/21</a:t>
+              <a:t>2/23/2021</a:t>
             </a:fld>
             <a:endParaRPr lang="en-US" dirty="0"/>
           </a:p>
@@ -3069,7 +3069,7 @@
             <a:fld id="{D57F1E4F-1CFF-5643-939E-217C01CDF565}" type="slidenum">
               <a:rPr lang="en-US" dirty="0"/>
               <a:pPr/>
-              <a:t>‹#›</a:t>
+              <a:t>‹Nr.›</a:t>
             </a:fld>
             <a:endParaRPr lang="en-US" dirty="0"/>
           </a:p>
@@ -3234,7 +3234,7 @@
             <a:fld id="{B61BEF0D-F0BB-DE4B-95CE-6DB70DBA9567}" type="datetimeFigureOut">
               <a:rPr lang="en-US" dirty="0"/>
               <a:pPr/>
-              <a:t>2/22/21</a:t>
+              <a:t>2/23/2021</a:t>
             </a:fld>
             <a:endParaRPr lang="en-US" dirty="0"/>
           </a:p>
@@ -3309,7 +3309,7 @@
             <a:fld id="{D57F1E4F-1CFF-5643-939E-217C01CDF565}" type="slidenum">
               <a:rPr lang="en-US" dirty="0"/>
               <a:pPr/>
-              <a:t>‹#›</a:t>
+              <a:t>‹Nr.›</a:t>
             </a:fld>
             <a:endParaRPr lang="en-US" dirty="0"/>
           </a:p>
@@ -3847,16 +3847,64 @@
             <p:ph type="ctrTitle"/>
           </p:nvPr>
         </p:nvSpPr>
-        <p:spPr/>
+        <p:spPr>
+          <a:xfrm>
+            <a:off x="581191" y="780585"/>
+            <a:ext cx="10993549" cy="2018371"/>
+          </a:xfrm>
+        </p:spPr>
         <p:txBody>
           <a:bodyPr>
-            <a:normAutofit/>
+            <a:normAutofit fontScale="90000"/>
           </a:bodyPr>
           <a:lstStyle/>
           <a:p>
             <a:pPr algn="ctr"/>
             <a:r>
+              <a:rPr lang="en-US" sz="2000" b="1" i="0" cap="none" dirty="0">
+                <a:solidFill>
+                  <a:srgbClr val="363534"/>
+                </a:solidFill>
+                <a:effectLst/>
+              </a:rPr>
+              <a:t>Doctoral colloquium – </a:t>
+            </a:r>
+            <a:r>
+              <a:rPr lang="en-US" sz="2000" b="1" i="0" cap="none" dirty="0" err="1">
+                <a:solidFill>
+                  <a:srgbClr val="363534"/>
+                </a:solidFill>
+                <a:effectLst/>
+              </a:rPr>
+              <a:t>DGfS</a:t>
+            </a:r>
+            <a:r>
+              <a:rPr lang="en-US" sz="2000" b="1" i="0" cap="none" dirty="0">
+                <a:solidFill>
+                  <a:srgbClr val="363534"/>
+                </a:solidFill>
+                <a:effectLst/>
+              </a:rPr>
+              <a:t> 2021, Freiburg</a:t>
+            </a:r>
+            <a:br>
+              <a:rPr lang="en-US" sz="2000" b="1" i="0" cap="none" dirty="0">
+                <a:solidFill>
+                  <a:srgbClr val="363534"/>
+                </a:solidFill>
+                <a:effectLst/>
+              </a:rPr>
+            </a:br>
+            <a:br>
               <a:rPr lang="en-US" b="1" i="0" cap="none" dirty="0">
+                <a:solidFill>
+                  <a:srgbClr val="363534"/>
+                </a:solidFill>
+                <a:effectLst/>
+              </a:rPr>
+            </a:br>
+            <a:r>
+              <a:rPr lang="en-US" sz="4000" b="1" i="0" cap="none" dirty="0">
                 <a:solidFill>
                   <a:srgbClr val="363534"/>
                 </a:solidFill>
@@ -3865,7 +3913,7 @@
               <a:t>Workshop: Data wrangling &amp; reproducible reports with </a:t>
             </a:r>
             <a:r>
-              <a:rPr lang="en-US" b="1" i="0" cap="none" dirty="0" err="1">
+              <a:rPr lang="en-US" sz="4000" b="1" i="0" cap="none" dirty="0" err="1">
                 <a:solidFill>
                   <a:srgbClr val="363534"/>
                 </a:solidFill>
@@ -3874,7 +3922,7 @@
               <a:t>tidyverse</a:t>
             </a:r>
             <a:r>
-              <a:rPr lang="en-US" b="1" i="0" cap="none" dirty="0">
+              <a:rPr lang="en-US" sz="4000" b="1" i="0" cap="none" dirty="0">
                 <a:solidFill>
                   <a:srgbClr val="363534"/>
                 </a:solidFill>

</xml_diff>